<commit_message>
processing last minute feedback
</commit_message>
<xml_diff>
--- a/Milestones/M10 defence/M10.pptx
+++ b/Milestones/M10 defence/M10.pptx
@@ -6,10 +6,10 @@
     <p:sldMasterId id="2147483694" r:id="rId2"/>
   </p:sldMasterIdLst>
   <p:notesMasterIdLst>
-    <p:notesMasterId r:id="rId30"/>
+    <p:notesMasterId r:id="rId31"/>
   </p:notesMasterIdLst>
   <p:handoutMasterIdLst>
-    <p:handoutMasterId r:id="rId31"/>
+    <p:handoutMasterId r:id="rId32"/>
   </p:handoutMasterIdLst>
   <p:sldIdLst>
     <p:sldId id="261" r:id="rId3"/>
@@ -38,7 +38,8 @@
     <p:sldId id="318" r:id="rId26"/>
     <p:sldId id="310" r:id="rId27"/>
     <p:sldId id="275" r:id="rId28"/>
-    <p:sldId id="269" r:id="rId29"/>
+    <p:sldId id="321" r:id="rId29"/>
+    <p:sldId id="269" r:id="rId30"/>
   </p:sldIdLst>
   <p:sldSz cx="12192000" cy="6858000"/>
   <p:notesSz cx="6858000" cy="9144000"/>
@@ -5543,7 +5544,7 @@
           <a:p>
             <a:fld id="{8F591CCF-F6FD-734B-854A-5BC033593B1E}" type="datetimeFigureOut">
               <a:rPr lang="nl-NL" smtClean="0"/>
-              <a:t>30-1-2023</a:t>
+              <a:t>31-1-2023</a:t>
             </a:fld>
             <a:endParaRPr lang="nl-NL"/>
           </a:p>
@@ -5708,7 +5709,7 @@
           <a:p>
             <a:fld id="{23C66214-DB21-4647-B5DA-0D17CA592867}" type="datetimeFigureOut">
               <a:rPr lang="nl-NL" smtClean="0"/>
-              <a:t>30-1-2023</a:t>
+              <a:t>31-1-2023</a:t>
             </a:fld>
             <a:endParaRPr lang="nl-NL"/>
           </a:p>
@@ -8440,7 +8441,7 @@
           <a:p>
             <a:r>
               <a:rPr lang="nl-BE" dirty="0"/>
-              <a:t>Configuratie ruimte laten testen CPMpy heeft directe toegang tot de </a:t>
+              <a:t>Configuratie ruimte of hyperparameters laten testen CPMpy heeft directe toegang tot de </a:t>
             </a:r>
             <a:r>
               <a:rPr lang="nl-BE" dirty="0" err="1"/>
@@ -8501,6 +8502,28 @@
           </a:p>
           <a:p>
             <a:endParaRPr lang="nl-BE" dirty="0"/>
+          </a:p>
+          <a:p>
+            <a:r>
+              <a:rPr lang="nl-BE" dirty="0"/>
+              <a:t>Depth first </a:t>
+            </a:r>
+            <a:r>
+              <a:rPr lang="nl-BE" dirty="0" err="1"/>
+              <a:t>vs</a:t>
+            </a:r>
+            <a:r>
+              <a:rPr lang="nl-BE" dirty="0"/>
+              <a:t> </a:t>
+            </a:r>
+            <a:r>
+              <a:rPr lang="nl-BE" dirty="0" err="1"/>
+              <a:t>Branch</a:t>
+            </a:r>
+            <a:r>
+              <a:rPr lang="nl-BE" dirty="0"/>
+              <a:t> first</a:t>
+            </a:r>
           </a:p>
         </p:txBody>
       </p:sp>
@@ -8833,7 +8856,7 @@
           <a:bodyPr/>
           <a:lstStyle/>
           <a:p>
-            <a:endParaRPr lang="en-US" dirty="0"/>
+            <a:endParaRPr lang="nl-BE" dirty="0"/>
           </a:p>
         </p:txBody>
       </p:sp>
@@ -8855,6 +8878,90 @@
             <a:fld id="{8954E32A-327F-AF4B-8E1F-209FBF93D26D}" type="slidenum">
               <a:rPr lang="nl-NL" smtClean="0"/>
               <a:t>27</a:t>
+            </a:fld>
+            <a:endParaRPr lang="nl-NL"/>
+          </a:p>
+        </p:txBody>
+      </p:sp>
+    </p:spTree>
+    <p:extLst>
+      <p:ext uri="{BB962C8B-B14F-4D97-AF65-F5344CB8AC3E}">
+        <p14:creationId xmlns:p14="http://schemas.microsoft.com/office/powerpoint/2010/main" val="3872452234"/>
+      </p:ext>
+    </p:extLst>
+  </p:cSld>
+  <p:clrMapOvr>
+    <a:masterClrMapping/>
+  </p:clrMapOvr>
+</p:notes>
+</file>
+
+<file path=ppt/notesSlides/notesSlide28.xml><?xml version="1.0" encoding="utf-8"?>
+<p:notes xmlns:a="http://schemas.openxmlformats.org/drawingml/2006/main" xmlns:r="http://schemas.openxmlformats.org/officeDocument/2006/relationships" xmlns:p="http://schemas.openxmlformats.org/presentationml/2006/main">
+  <p:cSld>
+    <p:spTree>
+      <p:nvGrpSpPr>
+        <p:cNvPr id="1" name=""/>
+        <p:cNvGrpSpPr/>
+        <p:nvPr/>
+      </p:nvGrpSpPr>
+      <p:grpSpPr>
+        <a:xfrm>
+          <a:off x="0" y="0"/>
+          <a:ext cx="0" cy="0"/>
+          <a:chOff x="0" y="0"/>
+          <a:chExt cx="0" cy="0"/>
+        </a:xfrm>
+      </p:grpSpPr>
+      <p:sp>
+        <p:nvSpPr>
+          <p:cNvPr id="2" name="Slide Image Placeholder 1"/>
+          <p:cNvSpPr>
+            <a:spLocks noGrp="1" noRot="1" noChangeAspect="1"/>
+          </p:cNvSpPr>
+          <p:nvPr>
+            <p:ph type="sldImg"/>
+          </p:nvPr>
+        </p:nvSpPr>
+        <p:spPr/>
+      </p:sp>
+      <p:sp>
+        <p:nvSpPr>
+          <p:cNvPr id="3" name="Notes Placeholder 2"/>
+          <p:cNvSpPr>
+            <a:spLocks noGrp="1"/>
+          </p:cNvSpPr>
+          <p:nvPr>
+            <p:ph type="body" idx="1"/>
+          </p:nvPr>
+        </p:nvSpPr>
+        <p:spPr/>
+        <p:txBody>
+          <a:bodyPr/>
+          <a:lstStyle/>
+          <a:p>
+            <a:endParaRPr lang="en-US" dirty="0"/>
+          </a:p>
+        </p:txBody>
+      </p:sp>
+      <p:sp>
+        <p:nvSpPr>
+          <p:cNvPr id="4" name="Slide Number Placeholder 3"/>
+          <p:cNvSpPr>
+            <a:spLocks noGrp="1"/>
+          </p:cNvSpPr>
+          <p:nvPr>
+            <p:ph type="sldNum" sz="quarter" idx="5"/>
+          </p:nvPr>
+        </p:nvSpPr>
+        <p:spPr/>
+        <p:txBody>
+          <a:bodyPr/>
+          <a:lstStyle/>
+          <a:p>
+            <a:fld id="{8954E32A-327F-AF4B-8E1F-209FBF93D26D}" type="slidenum">
+              <a:rPr lang="nl-NL" smtClean="0"/>
+              <a:t>28</a:t>
             </a:fld>
             <a:endParaRPr lang="nl-NL"/>
           </a:p>
@@ -10698,7 +10805,7 @@
           <a:p>
             <a:fld id="{A6AC6004-332E-443B-AEE9-F68B98D86626}" type="datetime1">
               <a:rPr lang="nl-BE" smtClean="0"/>
-              <a:t>30/01/2023</a:t>
+              <a:t>31/01/2023</a:t>
             </a:fld>
             <a:endParaRPr lang="nl-NL"/>
           </a:p>
@@ -10981,7 +11088,7 @@
           <a:p>
             <a:fld id="{18BB5DFC-17D3-47A0-B171-B4E4D1575E7B}" type="datetime1">
               <a:rPr lang="nl-BE" smtClean="0"/>
-              <a:t>30/01/2023</a:t>
+              <a:t>31/01/2023</a:t>
             </a:fld>
             <a:endParaRPr lang="nl-NL"/>
           </a:p>
@@ -11311,7 +11418,7 @@
           <a:p>
             <a:fld id="{DFE966B0-6D13-414C-BF72-6FF6C60AEC98}" type="datetime1">
               <a:rPr lang="nl-BE" smtClean="0"/>
-              <a:t>30/01/2023</a:t>
+              <a:t>31/01/2023</a:t>
             </a:fld>
             <a:endParaRPr lang="nl-NL"/>
           </a:p>
@@ -11631,7 +11738,7 @@
           <a:p>
             <a:fld id="{C812C44A-F540-4B98-810B-5F6EB90D9C13}" type="datetime1">
               <a:rPr lang="nl-BE" smtClean="0"/>
-              <a:t>30/01/2023</a:t>
+              <a:t>31/01/2023</a:t>
             </a:fld>
             <a:endParaRPr lang="nl-NL" dirty="0"/>
           </a:p>
@@ -11952,7 +12059,7 @@
           <a:p>
             <a:fld id="{8363B599-027A-42E4-AF08-DCDA683C2C05}" type="datetime1">
               <a:rPr lang="nl-BE" smtClean="0"/>
-              <a:t>30/01/2023</a:t>
+              <a:t>31/01/2023</a:t>
             </a:fld>
             <a:endParaRPr lang="nl-NL" dirty="0"/>
           </a:p>
@@ -12094,7 +12201,7 @@
           <a:p>
             <a:fld id="{896510B4-3146-4BB8-B92E-62730CD81C72}" type="datetime1">
               <a:rPr lang="nl-BE" smtClean="0"/>
-              <a:t>30/01/2023</a:t>
+              <a:t>31/01/2023</a:t>
             </a:fld>
             <a:endParaRPr lang="nl-NL"/>
           </a:p>
@@ -12578,7 +12685,7 @@
           <a:p>
             <a:fld id="{9D02B56F-A388-429F-978E-7B79C73B0741}" type="datetime1">
               <a:rPr lang="nl-BE" smtClean="0"/>
-              <a:t>30/01/2023</a:t>
+              <a:t>31/01/2023</a:t>
             </a:fld>
             <a:endParaRPr lang="nl-NL" dirty="0"/>
           </a:p>
@@ -12699,7 +12806,7 @@
           <a:p>
             <a:fld id="{CFC1976B-B1C6-4CE3-88E7-0F7B3C0EB754}" type="datetime1">
               <a:rPr lang="nl-BE" smtClean="0"/>
-              <a:t>30/01/2023</a:t>
+              <a:t>31/01/2023</a:t>
             </a:fld>
             <a:endParaRPr lang="nl-NL"/>
           </a:p>
@@ -12820,7 +12927,7 @@
           <a:p>
             <a:fld id="{9D9EDC0B-32E5-488B-8BC1-103B52D9F530}" type="datetime1">
               <a:rPr lang="nl-BE" smtClean="0"/>
-              <a:t>30/01/2023</a:t>
+              <a:t>31/01/2023</a:t>
             </a:fld>
             <a:endParaRPr lang="nl-NL"/>
           </a:p>
@@ -13002,7 +13109,7 @@
           <a:p>
             <a:fld id="{47FF4611-E6C1-4123-99C9-582B0DC5EFCF}" type="datetime1">
               <a:rPr lang="nl-BE" smtClean="0"/>
-              <a:t>30/01/2023</a:t>
+              <a:t>31/01/2023</a:t>
             </a:fld>
             <a:endParaRPr lang="nl-NL" dirty="0"/>
           </a:p>
@@ -13286,7 +13393,7 @@
           <a:p>
             <a:fld id="{7E5B4B50-A2A3-4C24-AE79-A292DD23C44A}" type="datetime1">
               <a:rPr lang="nl-BE" smtClean="0"/>
-              <a:t>30/01/2023</a:t>
+              <a:t>31/01/2023</a:t>
             </a:fld>
             <a:endParaRPr lang="nl-NL" dirty="0"/>
           </a:p>
@@ -13927,7 +14034,7 @@
           <a:p>
             <a:fld id="{560602C3-E89F-44D5-8AA8-1213C1FA739E}" type="datetime1">
               <a:rPr lang="nl-BE" smtClean="0"/>
-              <a:t>30/01/2023</a:t>
+              <a:t>31/01/2023</a:t>
             </a:fld>
             <a:endParaRPr lang="nl-NL" dirty="0"/>
           </a:p>
@@ -14350,7 +14457,15 @@
           <a:p>
             <a:r>
               <a:rPr lang="en-GB" dirty="0"/>
-              <a:t>Fuzz Testing of Constraint Programming</a:t>
+              <a:t>Fuzz </a:t>
+            </a:r>
+            <a:r>
+              <a:rPr lang="en-GB" dirty="0" err="1"/>
+              <a:t>Testen</a:t>
+            </a:r>
+            <a:r>
+              <a:rPr lang="en-GB" dirty="0"/>
+              <a:t> van Constraint Programming</a:t>
             </a:r>
             <a:endParaRPr lang="nl-NL" dirty="0"/>
           </a:p>
@@ -14523,99 +14638,162 @@
           </a:p>
         </p:txBody>
       </p:sp>
-      <p:sp>
-        <p:nvSpPr>
-          <p:cNvPr id="8" name="Content Placeholder 7">
-            <a:extLst>
-              <a:ext uri="{FF2B5EF4-FFF2-40B4-BE49-F238E27FC236}">
-                <a16:creationId xmlns:a16="http://schemas.microsoft.com/office/drawing/2014/main" id="{349BF4B6-A4D5-F9BE-A7B7-4B3C2083EFD2}"/>
-              </a:ext>
-            </a:extLst>
-          </p:cNvPr>
-          <p:cNvSpPr>
-            <a:spLocks noGrp="1"/>
-          </p:cNvSpPr>
-          <p:nvPr>
-            <p:ph idx="1"/>
-          </p:nvPr>
-        </p:nvSpPr>
-        <p:spPr>
-          <a:xfrm>
-            <a:off x="576000" y="1656000"/>
-            <a:ext cx="11041200" cy="4464000"/>
-          </a:xfrm>
-        </p:spPr>
-        <p:txBody>
-          <a:bodyPr>
-            <a:normAutofit/>
-          </a:bodyPr>
-          <a:lstStyle/>
-          <a:p>
-            <a:r>
-              <a:rPr lang="nl-BE" dirty="0"/>
-              <a:t>Andere (maar equivalente) manier oplossen </a:t>
-            </a:r>
-          </a:p>
-          <a:p>
-            <a:endParaRPr lang="nl-BE" dirty="0"/>
-          </a:p>
-          <a:p>
-            <a:r>
-              <a:rPr lang="nl-BE" dirty="0"/>
-              <a:t>Enkele Metamorphic relations</a:t>
-            </a:r>
-          </a:p>
-          <a:p>
-            <a:pPr lvl="1"/>
-            <a:r>
-              <a:rPr lang="nl-BE" dirty="0" err="1"/>
-              <a:t>AllDifferent</a:t>
-            </a:r>
-            <a:r>
-              <a:rPr lang="nl-BE" dirty="0"/>
-              <a:t>([var1, var2, var3]) wordt [var1 != var2, var2 != var3, var3!=var1]</a:t>
-            </a:r>
-          </a:p>
-          <a:p>
-            <a:pPr lvl="1"/>
-            <a:r>
-              <a:rPr lang="nl-BE" dirty="0"/>
-              <a:t>(Boolean) constraint (</a:t>
-            </a:r>
-            <a:r>
-              <a:rPr lang="nl-BE" dirty="0" err="1"/>
-              <a:t>and</a:t>
-            </a:r>
-            <a:r>
-              <a:rPr lang="nl-BE" dirty="0"/>
-              <a:t> True)</a:t>
-            </a:r>
-          </a:p>
-          <a:p>
-            <a:pPr lvl="1"/>
-            <a:r>
-              <a:rPr lang="nl-BE" dirty="0"/>
-              <a:t>A =&lt; B wordt A &lt; (B + 1)</a:t>
-            </a:r>
-          </a:p>
-          <a:p>
-            <a:pPr lvl="1"/>
-            <a:r>
-              <a:rPr lang="nl-BE" dirty="0"/>
-              <a:t>…</a:t>
-            </a:r>
-          </a:p>
-          <a:p>
-            <a:endParaRPr lang="nl-BE" dirty="0"/>
-          </a:p>
-          <a:p>
-            <a:r>
-              <a:rPr lang="nl-BE" dirty="0"/>
-              <a:t>Flexibiliteit</a:t>
-            </a:r>
-          </a:p>
-        </p:txBody>
-      </p:sp>
+      <mc:AlternateContent xmlns:mc="http://schemas.openxmlformats.org/markup-compatibility/2006">
+        <mc:Choice xmlns:a14="http://schemas.microsoft.com/office/drawing/2010/main" Requires="a14">
+          <p:sp>
+            <p:nvSpPr>
+              <p:cNvPr id="8" name="Content Placeholder 7">
+                <a:extLst>
+                  <a:ext uri="{FF2B5EF4-FFF2-40B4-BE49-F238E27FC236}">
+                    <a16:creationId xmlns:a16="http://schemas.microsoft.com/office/drawing/2014/main" id="{349BF4B6-A4D5-F9BE-A7B7-4B3C2083EFD2}"/>
+                  </a:ext>
+                </a:extLst>
+              </p:cNvPr>
+              <p:cNvSpPr>
+                <a:spLocks noGrp="1"/>
+              </p:cNvSpPr>
+              <p:nvPr>
+                <p:ph idx="1"/>
+              </p:nvPr>
+            </p:nvSpPr>
+            <p:spPr>
+              <a:xfrm>
+                <a:off x="576000" y="1656000"/>
+                <a:ext cx="11041200" cy="4464000"/>
+              </a:xfrm>
+            </p:spPr>
+            <p:txBody>
+              <a:bodyPr>
+                <a:normAutofit/>
+              </a:bodyPr>
+              <a:lstStyle/>
+              <a:p>
+                <a:r>
+                  <a:rPr lang="nl-BE" dirty="0"/>
+                  <a:t>Andere (maar equivalente) manier oplossen </a:t>
+                </a:r>
+              </a:p>
+              <a:p>
+                <a:endParaRPr lang="nl-BE" dirty="0"/>
+              </a:p>
+              <a:p>
+                <a:r>
+                  <a:rPr lang="nl-BE" dirty="0"/>
+                  <a:t>Enkele Metamorphic transformaties</a:t>
+                </a:r>
+              </a:p>
+              <a:p>
+                <a:pPr lvl="1"/>
+                <a:r>
+                  <a:rPr lang="nl-BE" dirty="0"/>
+                  <a:t>Alldifferent([var1, var2, var3]) wordt [var1 != var2, var2!=var3, var3!=var1]</a:t>
+                </a:r>
+              </a:p>
+              <a:p>
+                <a:pPr lvl="1"/>
+                <a:r>
+                  <a:rPr lang="nl-BE" dirty="0"/>
+                  <a:t>(Boolean) constraint wordt constraint </a:t>
+                </a:r>
+                <a:r>
+                  <a:rPr lang="nl-BE" dirty="0" err="1"/>
+                  <a:t>and</a:t>
+                </a:r>
+                <a:r>
+                  <a:rPr lang="nl-BE" dirty="0"/>
+                  <a:t> True </a:t>
+                </a:r>
+                <a:endParaRPr lang="en-GB" i="1" dirty="0">
+                  <a:latin typeface="Cambria Math" panose="02040503050406030204" pitchFamily="18" charset="0"/>
+                </a:endParaRPr>
+              </a:p>
+              <a:p>
+                <a:pPr lvl="1"/>
+                <a:r>
+                  <a:rPr lang="nl-BE" dirty="0">
+                    <a:ea typeface="Cambria Math" panose="02040503050406030204" pitchFamily="18" charset="0"/>
+                  </a:rPr>
+                  <a:t>A </a:t>
+                </a:r>
+                <a14:m>
+                  <m:oMath xmlns:m="http://schemas.openxmlformats.org/officeDocument/2006/math">
+                    <m:r>
+                      <a:rPr lang="nl-BE" i="1" smtClean="0">
+                        <a:latin typeface="Cambria Math" panose="02040503050406030204" pitchFamily="18" charset="0"/>
+                        <a:ea typeface="Cambria Math" panose="02040503050406030204" pitchFamily="18" charset="0"/>
+                      </a:rPr>
+                      <m:t>≤</m:t>
+                    </m:r>
+                  </m:oMath>
+                </a14:m>
+                <a:r>
+                  <a:rPr lang="nl-BE" dirty="0"/>
+                  <a:t> B wordt A &lt; (B+1)</a:t>
+                </a:r>
+              </a:p>
+              <a:p>
+                <a:pPr lvl="1"/>
+                <a:r>
+                  <a:rPr lang="nl-BE" dirty="0"/>
+                  <a:t>…</a:t>
+                </a:r>
+              </a:p>
+              <a:p>
+                <a:endParaRPr lang="nl-BE" dirty="0"/>
+              </a:p>
+              <a:p>
+                <a:r>
+                  <a:rPr lang="nl-BE" dirty="0"/>
+                  <a:t>Flexibiliteit</a:t>
+                </a:r>
+              </a:p>
+            </p:txBody>
+          </p:sp>
+        </mc:Choice>
+        <mc:Fallback>
+          <p:sp>
+            <p:nvSpPr>
+              <p:cNvPr id="8" name="Content Placeholder 7">
+                <a:extLst>
+                  <a:ext uri="{FF2B5EF4-FFF2-40B4-BE49-F238E27FC236}">
+                    <a16:creationId xmlns:a16="http://schemas.microsoft.com/office/drawing/2014/main" id="{349BF4B6-A4D5-F9BE-A7B7-4B3C2083EFD2}"/>
+                  </a:ext>
+                </a:extLst>
+              </p:cNvPr>
+              <p:cNvSpPr>
+                <a:spLocks noGrp="1" noRot="1" noChangeAspect="1" noMove="1" noResize="1" noEditPoints="1" noAdjustHandles="1" noChangeArrowheads="1" noChangeShapeType="1" noTextEdit="1"/>
+              </p:cNvSpPr>
+              <p:nvPr>
+                <p:ph idx="1"/>
+              </p:nvPr>
+            </p:nvSpPr>
+            <p:spPr>
+              <a:xfrm>
+                <a:off x="576000" y="1656000"/>
+                <a:ext cx="11041200" cy="4464000"/>
+              </a:xfrm>
+              <a:blipFill>
+                <a:blip r:embed="rId3"/>
+                <a:stretch>
+                  <a:fillRect l="-717" t="-956"/>
+                </a:stretch>
+              </a:blipFill>
+            </p:spPr>
+            <p:txBody>
+              <a:bodyPr/>
+              <a:lstStyle/>
+              <a:p>
+                <a:r>
+                  <a:rPr lang="en-US">
+                    <a:noFill/>
+                  </a:rPr>
+                  <a:t> </a:t>
+                </a:r>
+              </a:p>
+            </p:txBody>
+          </p:sp>
+        </mc:Fallback>
+      </mc:AlternateContent>
     </p:spTree>
     <p:extLst>
       <p:ext uri="{BB962C8B-B14F-4D97-AF65-F5344CB8AC3E}">
@@ -14762,12 +14940,8 @@
           <a:lstStyle/>
           <a:p>
             <a:r>
-              <a:rPr lang="nl-BE" dirty="0"/>
-              <a:t>ook </a:t>
-            </a:r>
-            <a:r>
               <a:rPr lang="nl-BE" dirty="0" err="1"/>
-              <a:t>sementic</a:t>
+              <a:t>Sementic</a:t>
             </a:r>
             <a:r>
               <a:rPr lang="nl-BE" dirty="0"/>
@@ -16513,15 +16687,11 @@
           <a:p>
             <a:r>
               <a:rPr lang="nl-BE" dirty="0"/>
-              <a:t>Resultaten: Double </a:t>
-            </a:r>
-            <a:r>
-              <a:rPr lang="nl-BE" dirty="0" err="1"/>
-              <a:t>negation</a:t>
-            </a:r>
-            <a:r>
-              <a:rPr lang="nl-BE" dirty="0"/>
-              <a:t>-bug</a:t>
+              <a:t>Resultaten: </a:t>
+            </a:r>
+            <a:r>
+              <a:rPr lang="nl-BE" i="1" dirty="0"/>
+              <a:t>Double negatie-bug</a:t>
             </a:r>
           </a:p>
         </p:txBody>
@@ -16808,7 +16978,11 @@
           <a:p>
             <a:r>
               <a:rPr lang="nl-BE" dirty="0"/>
-              <a:t>Resultaten: Benaming van variabelen</a:t>
+              <a:t>Resultaten: </a:t>
+            </a:r>
+            <a:r>
+              <a:rPr lang="nl-BE" i="1" dirty="0"/>
+              <a:t>Benaming van variabelen</a:t>
             </a:r>
           </a:p>
         </p:txBody>
@@ -16954,7 +17128,11 @@
           <a:p>
             <a:r>
               <a:rPr lang="nl-BE" dirty="0"/>
-              <a:t>Resultaten: Benaming van variabelen</a:t>
+              <a:t>Resultaten: </a:t>
+            </a:r>
+            <a:r>
+              <a:rPr lang="nl-BE" i="1" dirty="0"/>
+              <a:t>Benaming van variabelen</a:t>
             </a:r>
           </a:p>
         </p:txBody>
@@ -16988,37 +17166,79 @@
           <a:lstStyle/>
           <a:p>
             <a:r>
+              <a:rPr lang="en-US" dirty="0">
+                <a:solidFill>
+                  <a:schemeClr val="bg1">
+                    <a:lumMod val="50000"/>
+                  </a:schemeClr>
+                </a:solidFill>
+              </a:rPr>
+              <a:t>% Generated by CPMpy</a:t>
+            </a:r>
+          </a:p>
+          <a:p>
+            <a:r>
+              <a:rPr lang="en-US" dirty="0">
+                <a:solidFill>
+                  <a:srgbClr val="7030A0"/>
+                </a:solidFill>
+              </a:rPr>
+              <a:t>include</a:t>
+            </a:r>
+            <a:r>
               <a:rPr lang="en-US" dirty="0"/>
-              <a:t>% Generated by CPMpy</a:t>
-            </a:r>
-          </a:p>
-          <a:p>
+              <a:t> </a:t>
+            </a:r>
+            <a:r>
+              <a:rPr lang="en-US" dirty="0">
+                <a:solidFill>
+                  <a:srgbClr val="FF9900"/>
+                </a:solidFill>
+              </a:rPr>
+              <a:t>"globals.mzn"</a:t>
+            </a:r>
+            <a:r>
+              <a:rPr lang="en-US" b="1" dirty="0"/>
+              <a:t>;</a:t>
+            </a:r>
+          </a:p>
+          <a:p>
+            <a:endParaRPr lang="en-US" dirty="0"/>
+          </a:p>
+          <a:p>
+            <a:r>
+              <a:rPr lang="en-US" dirty="0">
+                <a:solidFill>
+                  <a:srgbClr val="7030A0"/>
+                </a:solidFill>
+              </a:rPr>
+              <a:t>var</a:t>
+            </a:r>
             <a:r>
               <a:rPr lang="en-US" dirty="0"/>
-              <a:t>include "globals.mzn";</a:t>
-            </a:r>
-          </a:p>
-          <a:p>
-            <a:endParaRPr lang="en-US" dirty="0"/>
-          </a:p>
-          <a:p>
-            <a:r>
-              <a:rPr lang="en-US" dirty="0"/>
-              <a:t>var 0..9: +</a:t>
+              <a:t> 0..9: +</a:t>
             </a:r>
             <a:r>
               <a:rPr lang="en-US" dirty="0" err="1"/>
               <a:t>i</a:t>
             </a:r>
             <a:r>
+              <a:rPr lang="en-US" b="1" dirty="0"/>
+              <a:t>;</a:t>
+            </a:r>
+          </a:p>
+          <a:p>
+            <a:r>
+              <a:rPr lang="en-US" dirty="0">
+                <a:solidFill>
+                  <a:srgbClr val="7030A0"/>
+                </a:solidFill>
+              </a:rPr>
+              <a:t>constraint</a:t>
+            </a:r>
+            <a:r>
               <a:rPr lang="en-US" dirty="0"/>
-              <a:t>;</a:t>
-            </a:r>
-          </a:p>
-          <a:p>
-            <a:r>
-              <a:rPr lang="en-US" dirty="0"/>
-              <a:t>constraint (+</a:t>
+              <a:t> (+</a:t>
             </a:r>
             <a:r>
               <a:rPr lang="en-US" dirty="0" err="1"/>
@@ -17026,7 +17246,11 @@
             </a:r>
             <a:r>
               <a:rPr lang="en-US" dirty="0"/>
-              <a:t>) &gt; 0;</a:t>
+              <a:t>) &gt; 0</a:t>
+            </a:r>
+            <a:r>
+              <a:rPr lang="en-US" b="1" dirty="0"/>
+              <a:t>;</a:t>
             </a:r>
           </a:p>
         </p:txBody>
@@ -17136,6 +17360,106 @@
           </a:prstGeom>
         </p:spPr>
       </p:pic>
+      <p:sp>
+        <p:nvSpPr>
+          <p:cNvPr id="7" name="Freeform: Shape 6">
+            <a:extLst>
+              <a:ext uri="{FF2B5EF4-FFF2-40B4-BE49-F238E27FC236}">
+                <a16:creationId xmlns:a16="http://schemas.microsoft.com/office/drawing/2014/main" id="{FF7B296C-F05A-DFC2-049B-EE93A0088C7D}"/>
+              </a:ext>
+            </a:extLst>
+          </p:cNvPr>
+          <p:cNvSpPr/>
+          <p:nvPr/>
+        </p:nvSpPr>
+        <p:spPr>
+          <a:xfrm>
+            <a:off x="10384186" y="5134769"/>
+            <a:ext cx="95696" cy="45719"/>
+          </a:xfrm>
+          <a:custGeom>
+            <a:avLst/>
+            <a:gdLst>
+              <a:gd name="connsiteX0" fmla="*/ 0 w 942975"/>
+              <a:gd name="connsiteY0" fmla="*/ 28835 h 314698"/>
+              <a:gd name="connsiteX1" fmla="*/ 257175 w 942975"/>
+              <a:gd name="connsiteY1" fmla="*/ 314585 h 314698"/>
+              <a:gd name="connsiteX2" fmla="*/ 571500 w 942975"/>
+              <a:gd name="connsiteY2" fmla="*/ 260 h 314698"/>
+              <a:gd name="connsiteX3" fmla="*/ 942975 w 942975"/>
+              <a:gd name="connsiteY3" fmla="*/ 257435 h 314698"/>
+            </a:gdLst>
+            <a:ahLst/>
+            <a:cxnLst>
+              <a:cxn ang="0">
+                <a:pos x="connsiteX0" y="connsiteY0"/>
+              </a:cxn>
+              <a:cxn ang="0">
+                <a:pos x="connsiteX1" y="connsiteY1"/>
+              </a:cxn>
+              <a:cxn ang="0">
+                <a:pos x="connsiteX2" y="connsiteY2"/>
+              </a:cxn>
+              <a:cxn ang="0">
+                <a:pos x="connsiteX3" y="connsiteY3"/>
+              </a:cxn>
+            </a:cxnLst>
+            <a:rect l="l" t="t" r="r" b="b"/>
+            <a:pathLst>
+              <a:path w="942975" h="314698">
+                <a:moveTo>
+                  <a:pt x="0" y="28835"/>
+                </a:moveTo>
+                <a:cubicBezTo>
+                  <a:pt x="80962" y="174091"/>
+                  <a:pt x="161925" y="319347"/>
+                  <a:pt x="257175" y="314585"/>
+                </a:cubicBezTo>
+                <a:cubicBezTo>
+                  <a:pt x="352425" y="309823"/>
+                  <a:pt x="457200" y="9785"/>
+                  <a:pt x="571500" y="260"/>
+                </a:cubicBezTo>
+                <a:cubicBezTo>
+                  <a:pt x="685800" y="-9265"/>
+                  <a:pt x="847725" y="245529"/>
+                  <a:pt x="942975" y="257435"/>
+                </a:cubicBezTo>
+              </a:path>
+            </a:pathLst>
+          </a:custGeom>
+          <a:noFill/>
+          <a:ln w="12700">
+            <a:solidFill>
+              <a:srgbClr val="FF0000"/>
+            </a:solidFill>
+          </a:ln>
+        </p:spPr>
+        <p:style>
+          <a:lnRef idx="2">
+            <a:schemeClr val="accent1">
+              <a:shade val="50000"/>
+            </a:schemeClr>
+          </a:lnRef>
+          <a:fillRef idx="1">
+            <a:schemeClr val="accent1"/>
+          </a:fillRef>
+          <a:effectRef idx="0">
+            <a:schemeClr val="accent1"/>
+          </a:effectRef>
+          <a:fontRef idx="minor">
+            <a:schemeClr val="lt1"/>
+          </a:fontRef>
+        </p:style>
+        <p:txBody>
+          <a:bodyPr rtlCol="0" anchor="ctr"/>
+          <a:lstStyle/>
+          <a:p>
+            <a:pPr algn="ctr"/>
+            <a:endParaRPr lang="en-US"/>
+          </a:p>
+        </p:txBody>
+      </p:sp>
     </p:spTree>
     <p:extLst>
       <p:ext uri="{BB962C8B-B14F-4D97-AF65-F5344CB8AC3E}">
@@ -17248,7 +17572,15 @@
           <a:p>
             <a:r>
               <a:rPr lang="nl-BE" dirty="0"/>
-              <a:t>Resultaten: “Gurobi power”-bug</a:t>
+              <a:t>Resultaten: </a:t>
+            </a:r>
+            <a:r>
+              <a:rPr lang="nl-BE" i="1" dirty="0"/>
+              <a:t>Gurobi exponent</a:t>
+            </a:r>
+            <a:r>
+              <a:rPr lang="nl-BE" dirty="0"/>
+              <a:t>-bug</a:t>
             </a:r>
           </a:p>
         </p:txBody>
@@ -23063,10 +23395,9 @@
           <a:lstStyle/>
           <a:p>
             <a:r>
-              <a:rPr lang="en-US" dirty="0"/>
-              <a:t>Future work</a:t>
-            </a:r>
-            <a:endParaRPr lang="nl-BE" dirty="0"/>
+              <a:rPr lang="nl-BE" dirty="0"/>
+              <a:t>Toekomstige werk</a:t>
+            </a:r>
           </a:p>
         </p:txBody>
       </p:sp>
@@ -23126,7 +23457,7 @@
             <a:pPr lvl="1"/>
             <a:r>
               <a:rPr lang="nl-BE" dirty="0"/>
-              <a:t>Ook de fijnere instellingen van </a:t>
+              <a:t>Ook de hyperparameters van </a:t>
             </a:r>
             <a:r>
               <a:rPr lang="nl-BE" dirty="0" err="1"/>
@@ -23135,6 +23466,21 @@
             <a:r>
               <a:rPr lang="nl-BE" dirty="0"/>
               <a:t> testen[2]</a:t>
+            </a:r>
+          </a:p>
+          <a:p>
+            <a:pPr lvl="2"/>
+            <a:r>
+              <a:rPr lang="nl-BE" dirty="0"/>
+              <a:t>Bv. bugs bij combinatie van </a:t>
+            </a:r>
+            <a:r>
+              <a:rPr lang="nl-BE" dirty="0" err="1"/>
+              <a:t>constraints</a:t>
+            </a:r>
+            <a:r>
+              <a:rPr lang="nl-BE" dirty="0"/>
+              <a:t> en zoek methodes</a:t>
             </a:r>
           </a:p>
           <a:p>
@@ -23390,6 +23736,198 @@
 </file>
 
 <file path=ppt/slides/slide27.xml><?xml version="1.0" encoding="utf-8"?>
+<p:sld xmlns:a="http://schemas.openxmlformats.org/drawingml/2006/main" xmlns:r="http://schemas.openxmlformats.org/officeDocument/2006/relationships" xmlns:p="http://schemas.openxmlformats.org/presentationml/2006/main" show="0">
+  <p:cSld>
+    <p:spTree>
+      <p:nvGrpSpPr>
+        <p:cNvPr id="1" name=""/>
+        <p:cNvGrpSpPr/>
+        <p:nvPr/>
+      </p:nvGrpSpPr>
+      <p:grpSpPr>
+        <a:xfrm>
+          <a:off x="0" y="0"/>
+          <a:ext cx="0" cy="0"/>
+          <a:chOff x="0" y="0"/>
+          <a:chExt cx="0" cy="0"/>
+        </a:xfrm>
+      </p:grpSpPr>
+      <p:sp>
+        <p:nvSpPr>
+          <p:cNvPr id="3" name="Footer Placeholder 2">
+            <a:extLst>
+              <a:ext uri="{FF2B5EF4-FFF2-40B4-BE49-F238E27FC236}">
+                <a16:creationId xmlns:a16="http://schemas.microsoft.com/office/drawing/2014/main" id="{9DEC358F-5FE8-CFE8-C712-33F18D0AC4E7}"/>
+              </a:ext>
+            </a:extLst>
+          </p:cNvPr>
+          <p:cNvSpPr>
+            <a:spLocks noGrp="1"/>
+          </p:cNvSpPr>
+          <p:nvPr>
+            <p:ph type="ftr" sz="quarter" idx="11"/>
+          </p:nvPr>
+        </p:nvSpPr>
+        <p:spPr/>
+        <p:txBody>
+          <a:bodyPr/>
+          <a:lstStyle/>
+          <a:p>
+            <a:r>
+              <a:rPr lang="nl-NL"/>
+              <a:t>Faculteit Ingenieurswetenschappen, DTAI</a:t>
+            </a:r>
+          </a:p>
+        </p:txBody>
+      </p:sp>
+      <p:sp>
+        <p:nvSpPr>
+          <p:cNvPr id="4" name="Slide Number Placeholder 3">
+            <a:extLst>
+              <a:ext uri="{FF2B5EF4-FFF2-40B4-BE49-F238E27FC236}">
+                <a16:creationId xmlns:a16="http://schemas.microsoft.com/office/drawing/2014/main" id="{83E5AE0E-A28E-AB21-A117-4EA84A3D035F}"/>
+              </a:ext>
+            </a:extLst>
+          </p:cNvPr>
+          <p:cNvSpPr>
+            <a:spLocks noGrp="1"/>
+          </p:cNvSpPr>
+          <p:nvPr>
+            <p:ph type="sldNum" sz="quarter" idx="12"/>
+          </p:nvPr>
+        </p:nvSpPr>
+        <p:spPr/>
+        <p:txBody>
+          <a:bodyPr/>
+          <a:lstStyle/>
+          <a:p>
+            <a:fld id="{0A297500-7527-634B-90F4-69D0994C32B4}" type="slidenum">
+              <a:rPr lang="nl-NL" smtClean="0"/>
+              <a:t>27</a:t>
+            </a:fld>
+            <a:endParaRPr lang="nl-NL"/>
+          </a:p>
+        </p:txBody>
+      </p:sp>
+      <p:sp>
+        <p:nvSpPr>
+          <p:cNvPr id="5" name="Title 4">
+            <a:extLst>
+              <a:ext uri="{FF2B5EF4-FFF2-40B4-BE49-F238E27FC236}">
+                <a16:creationId xmlns:a16="http://schemas.microsoft.com/office/drawing/2014/main" id="{19E73E39-FB74-A448-89F2-15FF5A0CFE07}"/>
+              </a:ext>
+            </a:extLst>
+          </p:cNvPr>
+          <p:cNvSpPr>
+            <a:spLocks noGrp="1"/>
+          </p:cNvSpPr>
+          <p:nvPr>
+            <p:ph type="title"/>
+          </p:nvPr>
+        </p:nvSpPr>
+        <p:spPr/>
+        <p:txBody>
+          <a:bodyPr/>
+          <a:lstStyle/>
+          <a:p>
+            <a:r>
+              <a:rPr lang="nl-BE" dirty="0" err="1"/>
+              <a:t>Seeds</a:t>
+            </a:r>
+            <a:endParaRPr lang="nl-BE" dirty="0"/>
+          </a:p>
+        </p:txBody>
+      </p:sp>
+      <p:sp>
+        <p:nvSpPr>
+          <p:cNvPr id="8" name="Content Placeholder 7">
+            <a:extLst>
+              <a:ext uri="{FF2B5EF4-FFF2-40B4-BE49-F238E27FC236}">
+                <a16:creationId xmlns:a16="http://schemas.microsoft.com/office/drawing/2014/main" id="{349BF4B6-A4D5-F9BE-A7B7-4B3C2083EFD2}"/>
+              </a:ext>
+            </a:extLst>
+          </p:cNvPr>
+          <p:cNvSpPr>
+            <a:spLocks noGrp="1"/>
+          </p:cNvSpPr>
+          <p:nvPr>
+            <p:ph idx="1"/>
+          </p:nvPr>
+        </p:nvSpPr>
+        <p:spPr/>
+        <p:txBody>
+          <a:bodyPr/>
+          <a:lstStyle/>
+          <a:p>
+            <a:r>
+              <a:rPr lang="nl-BE" dirty="0"/>
+              <a:t>CP voorbeelden van CPMpy en </a:t>
+            </a:r>
+            <a:r>
+              <a:rPr lang="nl-BE" dirty="0" err="1"/>
+              <a:t>Hakank</a:t>
+            </a:r>
+            <a:endParaRPr lang="nl-BE" dirty="0"/>
+          </a:p>
+          <a:p>
+            <a:r>
+              <a:rPr lang="nl-BE" dirty="0"/>
+              <a:t>Bijna uitsluitend positieve (</a:t>
+            </a:r>
+            <a:r>
+              <a:rPr lang="nl-BE" dirty="0" err="1"/>
+              <a:t>sat</a:t>
+            </a:r>
+            <a:r>
+              <a:rPr lang="nl-BE" dirty="0"/>
+              <a:t>) voorbeelden</a:t>
+            </a:r>
+          </a:p>
+          <a:p>
+            <a:pPr lvl="1"/>
+            <a:r>
+              <a:rPr lang="nl-BE" dirty="0"/>
+              <a:t>Vermindert de kans om </a:t>
+            </a:r>
+            <a:r>
+              <a:rPr lang="nl-BE" dirty="0" err="1"/>
+              <a:t>wrongly</a:t>
+            </a:r>
+            <a:r>
+              <a:rPr lang="nl-BE" dirty="0"/>
+              <a:t> satisfiable bugs te vinden</a:t>
+            </a:r>
+          </a:p>
+          <a:p>
+            <a:r>
+              <a:rPr lang="nl-BE" dirty="0"/>
+              <a:t>Niet diverse </a:t>
+            </a:r>
+            <a:r>
+              <a:rPr lang="nl-BE" dirty="0" err="1"/>
+              <a:t>seeds</a:t>
+            </a:r>
+            <a:r>
+              <a:rPr lang="nl-BE" dirty="0"/>
+              <a:t> = niet diverse tests</a:t>
+            </a:r>
+          </a:p>
+        </p:txBody>
+      </p:sp>
+    </p:spTree>
+    <p:extLst>
+      <p:ext uri="{BB962C8B-B14F-4D97-AF65-F5344CB8AC3E}">
+        <p14:creationId xmlns:p14="http://schemas.microsoft.com/office/powerpoint/2010/main" val="3279833021"/>
+      </p:ext>
+    </p:extLst>
+  </p:cSld>
+  <p:clrMapOvr>
+    <a:masterClrMapping/>
+  </p:clrMapOvr>
+</p:sld>
+</file>
+
+<file path=ppt/slides/slide28.xml><?xml version="1.0" encoding="utf-8"?>
 <p:sld xmlns:a="http://schemas.openxmlformats.org/drawingml/2006/main" xmlns:r="http://schemas.openxmlformats.org/officeDocument/2006/relationships" xmlns:p="http://schemas.openxmlformats.org/presentationml/2006/main">
   <p:cSld>
     <p:spTree>
@@ -23490,7 +24028,7 @@
           <a:p>
             <a:fld id="{0A297500-7527-634B-90F4-69D0994C32B4}" type="slidenum">
               <a:rPr lang="nl-NL" smtClean="0"/>
-              <a:t>27</a:t>
+              <a:t>28</a:t>
             </a:fld>
             <a:endParaRPr lang="nl-NL"/>
           </a:p>
@@ -24179,10 +24717,10 @@
       </p:sp>
       <p:pic>
         <p:nvPicPr>
-          <p:cNvPr id="9" name="Picture 8">
+          <p:cNvPr id="11" name="Picture 10">
             <a:extLst>
               <a:ext uri="{FF2B5EF4-FFF2-40B4-BE49-F238E27FC236}">
-                <a16:creationId xmlns:a16="http://schemas.microsoft.com/office/drawing/2014/main" id="{08A9415A-637D-18FF-FDB3-B8DF39E53FAC}"/>
+                <a16:creationId xmlns:a16="http://schemas.microsoft.com/office/drawing/2014/main" id="{2EB7B63D-894D-A97D-2967-F33F5EC2E5E3}"/>
               </a:ext>
             </a:extLst>
           </p:cNvPr>
@@ -24191,16 +24729,15 @@
           </p:cNvPicPr>
           <p:nvPr/>
         </p:nvPicPr>
-        <p:blipFill>
+        <p:blipFill rotWithShape="1">
           <a:blip r:embed="rId3"/>
-          <a:stretch>
-            <a:fillRect/>
-          </a:stretch>
+          <a:srcRect l="1094" t="2479"/>
+          <a:stretch/>
         </p:blipFill>
         <p:spPr>
           <a:xfrm>
-            <a:off x="3645568" y="1042153"/>
-            <a:ext cx="7749720" cy="5040029"/>
+            <a:off x="3645568" y="1108521"/>
+            <a:ext cx="7970431" cy="5115814"/>
           </a:xfrm>
           <a:prstGeom prst="rect">
             <a:avLst/>
@@ -24394,7 +24931,7 @@
             <a:pPr lvl="1"/>
             <a:r>
               <a:rPr lang="nl-BE" dirty="0"/>
-              <a:t>Verkeerde aantal oplossingen</a:t>
+              <a:t>Verkeerd aantal oplossingen</a:t>
             </a:r>
           </a:p>
         </p:txBody>
@@ -24696,7 +25233,9 @@
         </p:nvSpPr>
         <p:spPr/>
         <p:txBody>
-          <a:bodyPr/>
+          <a:bodyPr>
+            <a:normAutofit/>
+          </a:bodyPr>
           <a:lstStyle/>
           <a:p>
             <a:pPr marL="457200" indent="-457200">
@@ -24704,11 +25243,11 @@
               <a:buAutoNum type="arabicPeriod"/>
             </a:pPr>
             <a:r>
-              <a:rPr lang="en-GB" dirty="0">
+              <a:rPr lang="nl-BE" dirty="0">
                 <a:effectLst/>
                 <a:latin typeface="Arial" panose="020B0604020202020204" pitchFamily="34" charset="0"/>
               </a:rPr>
-              <a:t>What fuzzing technique will find the most bugs?</a:t>
+              <a:t>Welke technieken vinden de meeste bugs?</a:t>
             </a:r>
           </a:p>
           <a:p>
@@ -24717,15 +25256,12 @@
               <a:buAutoNum type="arabicPeriod"/>
             </a:pPr>
             <a:r>
-              <a:rPr lang="en-GB" dirty="0">
+              <a:rPr lang="nl-BE" dirty="0">
                 <a:effectLst/>
                 <a:latin typeface="Arial" panose="020B0604020202020204" pitchFamily="34" charset="0"/>
               </a:rPr>
-              <a:t>What fuzzing technique will find the most critical bugs?</a:t>
-            </a:r>
-            <a:endParaRPr lang="en-GB" dirty="0">
-              <a:latin typeface="Arial" panose="020B0604020202020204" pitchFamily="34" charset="0"/>
-            </a:endParaRPr>
+              <a:t>Welke technieken vinden de meeste kritieke bugs?</a:t>
+            </a:r>
           </a:p>
           <a:p>
             <a:pPr marL="457200" indent="-457200">
@@ -24733,11 +25269,11 @@
               <a:buAutoNum type="arabicPeriod"/>
             </a:pPr>
             <a:r>
-              <a:rPr lang="en-GB" dirty="0">
+              <a:rPr lang="nl-BE" dirty="0">
                 <a:effectLst/>
                 <a:latin typeface="Arial" panose="020B0604020202020204" pitchFamily="34" charset="0"/>
               </a:rPr>
-              <a:t>What type of bugs will be found using which fuzzing technique? </a:t>
+              <a:t>Welke type bugs worden er gevonden met welke techniek?</a:t>
             </a:r>
           </a:p>
           <a:p>
@@ -24746,15 +25282,18 @@
               <a:buAutoNum type="arabicPeriod"/>
             </a:pPr>
             <a:r>
-              <a:rPr lang="en-GB" dirty="0">
+              <a:rPr lang="nl-BE" dirty="0">
                 <a:effectLst/>
                 <a:latin typeface="Arial" panose="020B0604020202020204" pitchFamily="34" charset="0"/>
               </a:rPr>
-              <a:t>How many (critical) bugs can we find?</a:t>
-            </a:r>
-            <a:endParaRPr lang="en-GB" dirty="0">
-              <a:latin typeface="Arial" panose="020B0604020202020204" pitchFamily="34" charset="0"/>
-            </a:endParaRPr>
+              <a:t>Hoev</a:t>
+            </a:r>
+            <a:r>
+              <a:rPr lang="nl-BE" dirty="0">
+                <a:latin typeface="Arial" panose="020B0604020202020204" pitchFamily="34" charset="0"/>
+              </a:rPr>
+              <a:t>eel en hoe erg zijn de gevonden (kritieke bugs)?</a:t>
+            </a:r>
           </a:p>
           <a:p>
             <a:pPr marL="457200" indent="-457200">
@@ -24762,11 +25301,11 @@
               <a:buAutoNum type="arabicPeriod"/>
             </a:pPr>
             <a:r>
-              <a:rPr lang="en-GB" dirty="0">
+              <a:rPr lang="nl-BE" dirty="0">
                 <a:effectLst/>
                 <a:latin typeface="Arial" panose="020B0604020202020204" pitchFamily="34" charset="0"/>
               </a:rPr>
-              <a:t>What are the causes of the bugs?</a:t>
+              <a:t>Waar liggen de oorzaken van de bugs?</a:t>
             </a:r>
           </a:p>
         </p:txBody>
@@ -25007,12 +25546,20 @@
           </a:bodyPr>
           <a:lstStyle/>
           <a:p>
+            <a:pPr marL="457200" indent="-457200">
+              <a:buFont typeface="+mj-lt"/>
+              <a:buAutoNum type="arabicPeriod"/>
+            </a:pPr>
             <a:r>
               <a:rPr lang="nl-BE" dirty="0"/>
               <a:t>Test origineel</a:t>
             </a:r>
           </a:p>
           <a:p>
+            <a:pPr marL="457200" indent="-457200">
+              <a:buFont typeface="+mj-lt"/>
+              <a:buAutoNum type="arabicPeriod"/>
+            </a:pPr>
             <a:r>
               <a:rPr lang="nl-BE" b="0" noProof="0" dirty="0"/>
               <a:t>Satisfiable equivalente </a:t>
@@ -25023,6 +25570,10 @@
             </a:r>
           </a:p>
           <a:p>
+            <a:pPr marL="457200" indent="-457200">
+              <a:buFont typeface="+mj-lt"/>
+              <a:buAutoNum type="arabicPeriod"/>
+            </a:pPr>
             <a:r>
               <a:rPr lang="nl-BE" dirty="0"/>
               <a:t>Test opnieuw</a:t>
@@ -25666,18 +26217,29 @@
           </a:bodyPr>
           <a:lstStyle/>
           <a:p>
+            <a:pPr marL="0" indent="0">
+              <a:buNone/>
+            </a:pPr>
             <a:r>
               <a:rPr lang="nl-BE" dirty="0"/>
               <a:t>CPMpy-STORM</a:t>
             </a:r>
           </a:p>
           <a:p>
+            <a:pPr marL="457200" indent="-457200">
+              <a:buFont typeface="+mj-lt"/>
+              <a:buAutoNum type="arabicPeriod"/>
+            </a:pPr>
             <a:r>
               <a:rPr lang="nl-BE" dirty="0"/>
               <a:t>Test origineel</a:t>
             </a:r>
           </a:p>
           <a:p>
+            <a:pPr marL="457200" indent="-457200">
+              <a:buFont typeface="+mj-lt"/>
+              <a:buAutoNum type="arabicPeriod"/>
+            </a:pPr>
             <a:r>
               <a:rPr lang="nl-BE" b="0" noProof="0" dirty="0"/>
               <a:t>Satisfiable equivalente </a:t>
@@ -25688,6 +26250,10 @@
             </a:r>
           </a:p>
           <a:p>
+            <a:pPr marL="457200" indent="-457200">
+              <a:buFont typeface="+mj-lt"/>
+              <a:buAutoNum type="arabicPeriod"/>
+            </a:pPr>
             <a:r>
               <a:rPr lang="nl-BE" dirty="0"/>
               <a:t>Test opnieuw</a:t>

</xml_diff>